<commit_message>
upd folders and projects
</commit_message>
<xml_diff>
--- a/Observer/docs-imgs/apresentacao-observer-dotnet7-mvc.pptx
+++ b/Observer/docs-imgs/apresentacao-observer-dotnet7-mvc.pptx
@@ -4454,10 +4454,10 @@
       </p:sp>
       <p:pic>
         <p:nvPicPr>
-          <p:cNvPr id="4" name="Imagem 3">
+          <p:cNvPr id="6" name="Imagem 5">
             <a:extLst>
               <a:ext uri="{FF2B5EF4-FFF2-40B4-BE49-F238E27FC236}">
-                <a16:creationId xmlns:a16="http://schemas.microsoft.com/office/drawing/2014/main" id="{27411156-9EAD-E704-8945-C8A7DC557836}"/>
+                <a16:creationId xmlns:a16="http://schemas.microsoft.com/office/drawing/2014/main" id="{47018F6A-84B6-3723-D804-1E09F0C0BFAE}"/>
               </a:ext>
             </a:extLst>
           </p:cNvPr>
@@ -4520,8 +4520,8 @@
         </p:nvSpPr>
         <p:spPr>
           <a:xfrm>
-            <a:off x="960500" y="2374250"/>
-            <a:ext cx="7327500" cy="2015700"/>
+            <a:off x="960500" y="3573710"/>
+            <a:ext cx="7327500" cy="816239"/>
           </a:xfrm>
           <a:prstGeom prst="rect">
             <a:avLst/>
@@ -4549,31 +4549,6 @@
               </a:spcAft>
               <a:buNone/>
             </a:pPr>
-            <a:r>
-              <a:rPr lang="en" sz="3600" dirty="0">
-                <a:latin typeface="Muli Light"/>
-                <a:ea typeface="Muli Light"/>
-                <a:cs typeface="Muli Light"/>
-                <a:sym typeface="Muli Light"/>
-              </a:rPr>
-              <a:t>👍📌📖🌏🔌🔑</a:t>
-            </a:r>
-            <a:br>
-              <a:rPr lang="en" sz="3600" dirty="0">
-                <a:latin typeface="Muli Light"/>
-                <a:ea typeface="Muli Light"/>
-                <a:cs typeface="Muli Light"/>
-                <a:sym typeface="Muli Light"/>
-              </a:rPr>
-            </a:br>
-            <a:br>
-              <a:rPr lang="en" sz="3600" dirty="0">
-                <a:latin typeface="Muli Light"/>
-                <a:ea typeface="Muli Light"/>
-                <a:cs typeface="Muli Light"/>
-                <a:sym typeface="Muli Light"/>
-              </a:rPr>
-            </a:br>
             <a:r>
               <a:rPr lang="en" sz="2400" dirty="0">
                 <a:solidFill>
@@ -4734,8 +4709,8 @@
         </p:nvSpPr>
         <p:spPr>
           <a:xfrm>
-            <a:off x="2977984" y="753550"/>
-            <a:ext cx="6051300" cy="1151100"/>
+            <a:off x="2514633" y="299657"/>
+            <a:ext cx="6344141" cy="2914151"/>
           </a:xfrm>
           <a:prstGeom prst="rect">
             <a:avLst/>
@@ -4781,7 +4756,7 @@
               <a:rPr lang="en" sz="1400" dirty="0"/>
             </a:br>
             <a:r>
-              <a:rPr lang="pt-BR" sz="1400" u="sng" dirty="0">
+              <a:rPr lang="pt-BR" sz="1400" b="1" u="sng" dirty="0">
                 <a:solidFill>
                   <a:schemeClr val="hlink"/>
                 </a:solidFill>
@@ -4789,7 +4764,7 @@
               <a:t>https://</a:t>
             </a:r>
             <a:r>
-              <a:rPr lang="pt-BR" sz="1400" u="sng" dirty="0" err="1">
+              <a:rPr lang="pt-BR" sz="1400" b="1" u="sng" dirty="0" err="1">
                 <a:solidFill>
                   <a:schemeClr val="hlink"/>
                 </a:solidFill>
@@ -4797,7 +4772,7 @@
               <a:t>www.udemy.com</a:t>
             </a:r>
             <a:r>
-              <a:rPr lang="pt-BR" sz="1400" u="sng" dirty="0">
+              <a:rPr lang="pt-BR" sz="1400" b="1" u="sng" dirty="0">
                 <a:solidFill>
                   <a:schemeClr val="hlink"/>
                 </a:solidFill>
@@ -4805,7 +4780,7 @@
               <a:t>/</a:t>
             </a:r>
             <a:r>
-              <a:rPr lang="pt-BR" sz="1400" u="sng" dirty="0" err="1">
+              <a:rPr lang="pt-BR" sz="1400" b="1" u="sng" dirty="0" err="1">
                 <a:solidFill>
                   <a:schemeClr val="hlink"/>
                 </a:solidFill>
@@ -4813,7 +4788,7 @@
               <a:t>user</a:t>
             </a:r>
             <a:r>
-              <a:rPr lang="pt-BR" sz="1400" u="sng" dirty="0">
+              <a:rPr lang="pt-BR" sz="1400" b="1" u="sng" dirty="0">
                 <a:solidFill>
                   <a:schemeClr val="hlink"/>
                 </a:solidFill>
@@ -4821,7 +4796,7 @@
               <a:t>/</a:t>
             </a:r>
             <a:r>
-              <a:rPr lang="pt-BR" sz="1400" u="sng" dirty="0" err="1">
+              <a:rPr lang="pt-BR" sz="1400" b="1" u="sng" dirty="0" err="1">
                 <a:solidFill>
                   <a:schemeClr val="hlink"/>
                 </a:solidFill>
@@ -4829,7 +4804,7 @@
               <a:t>carlos</a:t>
             </a:r>
             <a:r>
-              <a:rPr lang="pt-BR" sz="1400" u="sng" dirty="0">
+              <a:rPr lang="pt-BR" sz="1400" b="1" u="sng" dirty="0">
                 <a:solidFill>
                   <a:schemeClr val="hlink"/>
                 </a:solidFill>
@@ -4837,7 +4812,7 @@
               <a:t>-</a:t>
             </a:r>
             <a:r>
-              <a:rPr lang="pt-BR" sz="1400" u="sng" dirty="0" err="1">
+              <a:rPr lang="pt-BR" sz="1400" b="1" u="sng" dirty="0" err="1">
                 <a:solidFill>
                   <a:schemeClr val="hlink"/>
                 </a:solidFill>
@@ -4845,13 +4820,232 @@
               <a:t>alberto</a:t>
             </a:r>
             <a:r>
-              <a:rPr lang="pt-BR" sz="1400" u="sng" dirty="0">
+              <a:rPr lang="pt-BR" sz="1400" b="1" u="sng" dirty="0">
                 <a:solidFill>
                   <a:schemeClr val="hlink"/>
                 </a:solidFill>
               </a:rPr>
               <a:t>-dos-santos-34/</a:t>
             </a:r>
+            <a:br>
+              <a:rPr lang="pt-BR" sz="1400" b="1" u="sng" dirty="0">
+                <a:solidFill>
+                  <a:schemeClr val="hlink"/>
+                </a:solidFill>
+              </a:rPr>
+            </a:br>
+            <a:br>
+              <a:rPr lang="pt-BR" sz="1400" b="1" u="sng" dirty="0">
+                <a:solidFill>
+                  <a:schemeClr val="hlink"/>
+                </a:solidFill>
+              </a:rPr>
+            </a:br>
+            <a:r>
+              <a:rPr lang="pt-BR" sz="1400" u="sng" dirty="0">
+                <a:solidFill>
+                  <a:schemeClr val="hlink"/>
+                </a:solidFill>
+              </a:rPr>
+              <a:t>Código fonte no </a:t>
+            </a:r>
+            <a:r>
+              <a:rPr lang="pt-BR" sz="1400" u="sng" dirty="0" err="1">
+                <a:solidFill>
+                  <a:schemeClr val="hlink"/>
+                </a:solidFill>
+              </a:rPr>
+              <a:t>Github</a:t>
+            </a:r>
+            <a:r>
+              <a:rPr lang="pt-BR" sz="1400" u="sng" dirty="0">
+                <a:solidFill>
+                  <a:schemeClr val="hlink"/>
+                </a:solidFill>
+              </a:rPr>
+              <a:t>:</a:t>
+            </a:r>
+            <a:br>
+              <a:rPr lang="pt-BR" sz="1400" u="sng" dirty="0">
+                <a:solidFill>
+                  <a:schemeClr val="hlink"/>
+                </a:solidFill>
+              </a:rPr>
+            </a:br>
+            <a:r>
+              <a:rPr lang="pt-BR" sz="1400" b="1" u="sng" dirty="0">
+                <a:solidFill>
+                  <a:schemeClr val="hlink"/>
+                </a:solidFill>
+                <a:hlinkClick r:id="rId3"/>
+              </a:rPr>
+              <a:t>https://</a:t>
+            </a:r>
+            <a:r>
+              <a:rPr lang="pt-BR" sz="1400" b="1" u="sng" dirty="0" err="1">
+                <a:solidFill>
+                  <a:schemeClr val="hlink"/>
+                </a:solidFill>
+                <a:hlinkClick r:id="rId3"/>
+              </a:rPr>
+              <a:t>github.com</a:t>
+            </a:r>
+            <a:r>
+              <a:rPr lang="pt-BR" sz="1400" b="1" u="sng" dirty="0">
+                <a:solidFill>
+                  <a:schemeClr val="hlink"/>
+                </a:solidFill>
+                <a:hlinkClick r:id="rId3"/>
+              </a:rPr>
+              <a:t>/</a:t>
+            </a:r>
+            <a:r>
+              <a:rPr lang="pt-BR" sz="1400" b="1" u="sng" dirty="0" err="1">
+                <a:solidFill>
+                  <a:schemeClr val="hlink"/>
+                </a:solidFill>
+                <a:hlinkClick r:id="rId3"/>
+              </a:rPr>
+              <a:t>carlosItDevelop</a:t>
+            </a:r>
+            <a:r>
+              <a:rPr lang="pt-BR" sz="1400" b="1" u="sng" dirty="0">
+                <a:solidFill>
+                  <a:schemeClr val="hlink"/>
+                </a:solidFill>
+                <a:hlinkClick r:id="rId3"/>
+              </a:rPr>
+              <a:t>/observer-</a:t>
+            </a:r>
+            <a:r>
+              <a:rPr lang="pt-BR" sz="1400" b="1" u="sng" dirty="0" err="1">
+                <a:solidFill>
+                  <a:schemeClr val="hlink"/>
+                </a:solidFill>
+                <a:hlinkClick r:id="rId3"/>
+              </a:rPr>
+              <a:t>pattern</a:t>
+            </a:r>
+            <a:r>
+              <a:rPr lang="pt-BR" sz="1400" b="1" u="sng" dirty="0">
+                <a:solidFill>
+                  <a:schemeClr val="hlink"/>
+                </a:solidFill>
+                <a:hlinkClick r:id="rId3"/>
+              </a:rPr>
+              <a:t>-em-</a:t>
+            </a:r>
+            <a:r>
+              <a:rPr lang="pt-BR" sz="1400" b="1" u="sng" dirty="0" err="1">
+                <a:solidFill>
+                  <a:schemeClr val="hlink"/>
+                </a:solidFill>
+                <a:hlinkClick r:id="rId3"/>
+              </a:rPr>
+              <a:t>asp.netcore</a:t>
+            </a:r>
+            <a:r>
+              <a:rPr lang="pt-BR" sz="1400" b="1" u="sng" dirty="0">
+                <a:solidFill>
+                  <a:schemeClr val="hlink"/>
+                </a:solidFill>
+                <a:hlinkClick r:id="rId3"/>
+              </a:rPr>
+              <a:t>-</a:t>
+            </a:r>
+            <a:r>
+              <a:rPr lang="pt-BR" sz="1400" b="1" u="sng" dirty="0" err="1">
+                <a:solidFill>
+                  <a:schemeClr val="hlink"/>
+                </a:solidFill>
+                <a:hlinkClick r:id="rId3"/>
+              </a:rPr>
+              <a:t>mvc</a:t>
+            </a:r>
+            <a:br>
+              <a:rPr lang="pt-BR" sz="1400" b="1" u="sng" dirty="0">
+                <a:solidFill>
+                  <a:schemeClr val="hlink"/>
+                </a:solidFill>
+              </a:rPr>
+            </a:br>
+            <a:endParaRPr lang="pt-BR" sz="1400" b="1" u="sng" dirty="0">
+              <a:solidFill>
+                <a:schemeClr val="hlink"/>
+              </a:solidFill>
+            </a:endParaRPr>
+          </a:p>
+          <a:p>
+            <a:pPr marL="0" lvl="0" indent="0" algn="l" rtl="0">
+              <a:spcBef>
+                <a:spcPts val="600"/>
+              </a:spcBef>
+              <a:spcAft>
+                <a:spcPts val="0"/>
+              </a:spcAft>
+              <a:buNone/>
+            </a:pPr>
+            <a:r>
+              <a:rPr lang="pt-BR" sz="1400" u="sng" dirty="0">
+                <a:solidFill>
+                  <a:schemeClr val="hlink"/>
+                </a:solidFill>
+              </a:rPr>
+              <a:t>Nosso grupo no Telegram:</a:t>
+            </a:r>
+            <a:br>
+              <a:rPr lang="pt-BR" sz="1400" u="sng" dirty="0">
+                <a:solidFill>
+                  <a:schemeClr val="hlink"/>
+                </a:solidFill>
+              </a:rPr>
+            </a:br>
+            <a:r>
+              <a:rPr lang="pt-BR" sz="1400" b="1" u="sng" dirty="0">
+                <a:solidFill>
+                  <a:schemeClr val="hlink"/>
+                </a:solidFill>
+              </a:rPr>
+              <a:t>https://</a:t>
+            </a:r>
+            <a:r>
+              <a:rPr lang="pt-BR" sz="1400" b="1" u="sng" dirty="0" err="1">
+                <a:solidFill>
+                  <a:schemeClr val="hlink"/>
+                </a:solidFill>
+              </a:rPr>
+              <a:t>t.me</a:t>
+            </a:r>
+            <a:r>
+              <a:rPr lang="pt-BR" sz="1400" b="1" u="sng" dirty="0">
+                <a:solidFill>
+                  <a:schemeClr val="hlink"/>
+                </a:solidFill>
+              </a:rPr>
+              <a:t>/</a:t>
+            </a:r>
+            <a:r>
+              <a:rPr lang="pt-BR" sz="1400" b="1" u="sng" dirty="0" err="1">
+                <a:solidFill>
+                  <a:schemeClr val="hlink"/>
+                </a:solidFill>
+              </a:rPr>
+              <a:t>AspNetCoreZeroAoNinja</a:t>
+            </a:r>
+            <a:br>
+              <a:rPr lang="pt-BR" sz="1400" b="1" u="sng" dirty="0">
+                <a:solidFill>
+                  <a:schemeClr val="hlink"/>
+                </a:solidFill>
+              </a:rPr>
+            </a:br>
+            <a:br>
+              <a:rPr lang="pt-BR" sz="1400" u="sng" dirty="0">
+                <a:solidFill>
+                  <a:schemeClr val="hlink"/>
+                </a:solidFill>
+              </a:rPr>
+            </a:br>
             <a:endParaRPr sz="1400" dirty="0"/>
           </a:p>
         </p:txBody>
@@ -4871,19 +5065,32 @@
           <p:nvPr/>
         </p:nvPicPr>
         <p:blipFill>
-          <a:blip r:embed="rId3"/>
+          <a:blip r:embed="rId4"/>
           <a:stretch>
             <a:fillRect/>
           </a:stretch>
         </p:blipFill>
         <p:spPr>
           <a:xfrm flipH="1">
-            <a:off x="1083025" y="753550"/>
+            <a:off x="528717" y="619327"/>
             <a:ext cx="1713258" cy="1296001"/>
           </a:xfrm>
           <a:prstGeom prst="rect">
             <a:avLst/>
           </a:prstGeom>
+          <a:effectLst>
+            <a:glow rad="101600">
+              <a:schemeClr val="accent3">
+                <a:satMod val="175000"/>
+                <a:alpha val="40000"/>
+              </a:schemeClr>
+            </a:glow>
+            <a:outerShdw blurRad="50800" dist="38100" dir="13500000" algn="br" rotWithShape="0">
+              <a:prstClr val="black">
+                <a:alpha val="40000"/>
+              </a:prstClr>
+            </a:outerShdw>
+          </a:effectLst>
         </p:spPr>
       </p:pic>
       <p:sp>
@@ -4900,7 +5107,7 @@
         </p:nvSpPr>
         <p:spPr>
           <a:xfrm>
-            <a:off x="6742900" y="3093950"/>
+            <a:off x="7039984" y="3453851"/>
             <a:ext cx="1440600" cy="1296000"/>
           </a:xfrm>
           <a:prstGeom prst="rect">
@@ -9387,20 +9594,8 @@
               <a:buNone/>
             </a:pPr>
             <a:r>
-              <a:rPr lang="pt-BR" sz="1600"/>
-              <a:t>Observer </a:t>
-            </a:r>
-            <a:r>
               <a:rPr lang="pt-BR" sz="1600" dirty="0"/>
-              <a:t>Pattern com Asp.Net Core 7 </a:t>
-            </a:r>
-            <a:r>
-              <a:rPr lang="pt-BR" sz="1600" dirty="0" err="1"/>
-              <a:t>Mvc</a:t>
-            </a:r>
-            <a:r>
-              <a:rPr lang="pt-BR" sz="1600" dirty="0"/>
-              <a:t>, EntityFramework Core 7 e mais</a:t>
+              <a:t>Observer Pattern com Asp.Net Core 7 MVC, EntityFramework Core 7 e mais</a:t>
             </a:r>
           </a:p>
         </p:txBody>
@@ -9417,8 +9612,8 @@
         </p:nvSpPr>
         <p:spPr>
           <a:xfrm>
-            <a:off x="919450" y="714986"/>
-            <a:ext cx="4273336" cy="4428513"/>
+            <a:off x="580550" y="714939"/>
+            <a:ext cx="4273336" cy="3588614"/>
           </a:xfrm>
           <a:prstGeom prst="rect">
             <a:avLst/>
@@ -9430,6 +9625,251 @@
           </a:bodyPr>
           <a:lstStyle/>
           <a:p>
+            <a:pPr marL="171450" lvl="0" indent="-171450" algn="l" rtl="0">
+              <a:spcBef>
+                <a:spcPts val="600"/>
+              </a:spcBef>
+              <a:spcAft>
+                <a:spcPts val="0"/>
+              </a:spcAft>
+              <a:buFontTx/>
+              <a:buChar char="-"/>
+            </a:pPr>
+            <a:endParaRPr lang="pt-BR" sz="1100" b="1" dirty="0"/>
+          </a:p>
+          <a:p>
+            <a:pPr marL="171450" lvl="0" indent="-171450" algn="l" rtl="0">
+              <a:spcBef>
+                <a:spcPts val="600"/>
+              </a:spcBef>
+              <a:spcAft>
+                <a:spcPts val="0"/>
+              </a:spcAft>
+              <a:buFontTx/>
+              <a:buChar char="-"/>
+            </a:pPr>
+            <a:r>
+              <a:rPr lang="pt-BR" sz="1100" b="1" dirty="0"/>
+              <a:t>O QUE VEREMOS NESTE TUTORIAL</a:t>
+            </a:r>
+          </a:p>
+          <a:p>
+            <a:pPr marL="1085850" lvl="2" indent="-171450">
+              <a:spcBef>
+                <a:spcPts val="600"/>
+              </a:spcBef>
+              <a:buFontTx/>
+              <a:buChar char="-"/>
+            </a:pPr>
+            <a:r>
+              <a:rPr lang="pt-BR" sz="1100" b="1" dirty="0"/>
+              <a:t>(Com foco no Observer Pattern):</a:t>
+            </a:r>
+          </a:p>
+          <a:p>
+            <a:pPr marL="171450" lvl="0" indent="-171450" algn="l" rtl="0">
+              <a:spcBef>
+                <a:spcPts val="600"/>
+              </a:spcBef>
+              <a:spcAft>
+                <a:spcPts val="0"/>
+              </a:spcAft>
+              <a:buFontTx/>
+              <a:buChar char="-"/>
+            </a:pPr>
+            <a:endParaRPr lang="pt-BR" sz="1100" b="1" dirty="0"/>
+          </a:p>
+          <a:p>
+            <a:pPr marL="171450" lvl="0" indent="-171450" algn="l" rtl="0">
+              <a:spcBef>
+                <a:spcPts val="600"/>
+              </a:spcBef>
+              <a:spcAft>
+                <a:spcPts val="0"/>
+              </a:spcAft>
+              <a:buFont typeface="Wingdings" panose="05000000000000000000" pitchFamily="2" charset="2"/>
+              <a:buChar char="ü"/>
+            </a:pPr>
+            <a:r>
+              <a:rPr lang="pt-BR" sz="900" dirty="0"/>
+              <a:t>Repository Pattern &amp; UnitOfWork Pattern;</a:t>
+            </a:r>
+          </a:p>
+          <a:p>
+            <a:pPr marL="171450" lvl="0" indent="-171450" algn="l" rtl="0">
+              <a:spcBef>
+                <a:spcPts val="600"/>
+              </a:spcBef>
+              <a:spcAft>
+                <a:spcPts val="0"/>
+              </a:spcAft>
+              <a:buFont typeface="Wingdings" panose="05000000000000000000" pitchFamily="2" charset="2"/>
+              <a:buChar char="ü"/>
+            </a:pPr>
+            <a:r>
+              <a:rPr lang="pt-BR" sz="900" dirty="0"/>
+              <a:t>GenericRepository;</a:t>
+            </a:r>
+          </a:p>
+          <a:p>
+            <a:pPr marL="171450" lvl="0" indent="-171450" algn="l" rtl="0">
+              <a:spcBef>
+                <a:spcPts val="600"/>
+              </a:spcBef>
+              <a:spcAft>
+                <a:spcPts val="0"/>
+              </a:spcAft>
+              <a:buFont typeface="Wingdings" panose="05000000000000000000" pitchFamily="2" charset="2"/>
+              <a:buChar char="ü"/>
+            </a:pPr>
+            <a:r>
+              <a:rPr lang="pt-BR" sz="900" dirty="0"/>
+              <a:t>Composição de Transações Únicas no DbContext;</a:t>
+            </a:r>
+          </a:p>
+          <a:p>
+            <a:pPr marL="171450" lvl="0" indent="-171450" algn="l" rtl="0">
+              <a:spcBef>
+                <a:spcPts val="600"/>
+              </a:spcBef>
+              <a:spcAft>
+                <a:spcPts val="0"/>
+              </a:spcAft>
+              <a:buFont typeface="Wingdings" panose="05000000000000000000" pitchFamily="2" charset="2"/>
+              <a:buChar char="ü"/>
+            </a:pPr>
+            <a:r>
+              <a:rPr lang="pt-BR" sz="900" dirty="0"/>
+              <a:t>Fluent Api com EntityTypeConfiguration;</a:t>
+            </a:r>
+          </a:p>
+          <a:p>
+            <a:pPr marL="171450" lvl="0" indent="-171450" algn="l" rtl="0">
+              <a:spcBef>
+                <a:spcPts val="600"/>
+              </a:spcBef>
+              <a:spcAft>
+                <a:spcPts val="0"/>
+              </a:spcAft>
+              <a:buFont typeface="Wingdings" panose="05000000000000000000" pitchFamily="2" charset="2"/>
+              <a:buChar char="ü"/>
+            </a:pPr>
+            <a:r>
+              <a:rPr lang="pt-BR" sz="900" dirty="0"/>
+              <a:t>ApplyConfigurationFromAssembly para unificar Mappings das Entidades;</a:t>
+            </a:r>
+          </a:p>
+          <a:p>
+            <a:pPr marL="171450" lvl="0" indent="-171450" algn="l" rtl="0">
+              <a:spcBef>
+                <a:spcPts val="600"/>
+              </a:spcBef>
+              <a:spcAft>
+                <a:spcPts val="0"/>
+              </a:spcAft>
+              <a:buFont typeface="Wingdings" panose="05000000000000000000" pitchFamily="2" charset="2"/>
+              <a:buChar char="ü"/>
+            </a:pPr>
+            <a:r>
+              <a:rPr lang="pt-BR" sz="900" dirty="0"/>
+              <a:t>Override ConfigureConventions; - (Polimorfismo);</a:t>
+            </a:r>
+          </a:p>
+          <a:p>
+            <a:pPr marL="171450" lvl="0" indent="-171450" algn="l" rtl="0">
+              <a:spcBef>
+                <a:spcPts val="600"/>
+              </a:spcBef>
+              <a:spcAft>
+                <a:spcPts val="0"/>
+              </a:spcAft>
+              <a:buFont typeface="Wingdings" panose="05000000000000000000" pitchFamily="2" charset="2"/>
+              <a:buChar char="ü"/>
+            </a:pPr>
+            <a:r>
+              <a:rPr lang="pt-BR" sz="900" dirty="0"/>
+              <a:t>Services: Pedido, Email. SMS e WhatsApp;</a:t>
+            </a:r>
+          </a:p>
+          <a:p>
+            <a:pPr marL="171450" lvl="0" indent="-171450" algn="l" rtl="0">
+              <a:spcBef>
+                <a:spcPts val="600"/>
+              </a:spcBef>
+              <a:spcAft>
+                <a:spcPts val="0"/>
+              </a:spcAft>
+              <a:buFont typeface="Wingdings" panose="05000000000000000000" pitchFamily="2" charset="2"/>
+              <a:buChar char="ü"/>
+            </a:pPr>
+            <a:r>
+              <a:rPr lang="pt-BR" sz="900" dirty="0"/>
+              <a:t>ViewComponent com TagHelp Personalizada - (DRY - Don't Repeate Yourself);</a:t>
+            </a:r>
+          </a:p>
+          <a:p>
+            <a:pPr marL="171450" lvl="0" indent="-171450" algn="l" rtl="0">
+              <a:spcBef>
+                <a:spcPts val="600"/>
+              </a:spcBef>
+              <a:spcAft>
+                <a:spcPts val="0"/>
+              </a:spcAft>
+              <a:buFont typeface="Wingdings" panose="05000000000000000000" pitchFamily="2" charset="2"/>
+              <a:buChar char="ü"/>
+            </a:pPr>
+            <a:r>
+              <a:rPr lang="pt-BR" sz="900" dirty="0"/>
+              <a:t>Configuração de Ambientes e User Secrets;</a:t>
+            </a:r>
+          </a:p>
+          <a:p>
+            <a:pPr marL="171450" lvl="0" indent="-171450" algn="l" rtl="0">
+              <a:spcBef>
+                <a:spcPts val="600"/>
+              </a:spcBef>
+              <a:spcAft>
+                <a:spcPts val="0"/>
+              </a:spcAft>
+              <a:buFont typeface="Wingdings" panose="05000000000000000000" pitchFamily="2" charset="2"/>
+              <a:buChar char="ü"/>
+            </a:pPr>
+            <a:r>
+              <a:rPr lang="pt-BR" sz="900" dirty="0"/>
+              <a:t>DataTables com Bootstrap 5.1.3 - (Ferramentas Externas);</a:t>
+            </a:r>
+          </a:p>
+          <a:p>
+            <a:pPr marL="171450" indent="-171450">
+              <a:buFont typeface="Wingdings" panose="05000000000000000000" pitchFamily="2" charset="2"/>
+              <a:buChar char="ü"/>
+            </a:pPr>
+            <a:r>
+              <a:rPr lang="pt-BR" sz="900" dirty="0">
+                <a:solidFill>
+                  <a:schemeClr val="bg1"/>
+                </a:solidFill>
+                <a:latin typeface="Muli Light" panose="020B0604020202020204" charset="0"/>
+              </a:rPr>
+              <a:t>Notificações no Menu DropDown;</a:t>
+            </a:r>
+          </a:p>
+          <a:p>
+            <a:pPr marL="171450" indent="-171450">
+              <a:buFont typeface="Wingdings" panose="05000000000000000000" pitchFamily="2" charset="2"/>
+              <a:buChar char="ü"/>
+            </a:pPr>
+            <a:r>
+              <a:rPr lang="pt-BR" sz="900" dirty="0">
+                <a:solidFill>
+                  <a:schemeClr val="bg1"/>
+                </a:solidFill>
+                <a:latin typeface="Muli Light" panose="020B0604020202020204" charset="0"/>
+              </a:rPr>
+              <a:t>Enun Extension - Extension Method - O do SOLID;</a:t>
+            </a:r>
+          </a:p>
+          <a:p>
             <a:pPr marL="0" lvl="0" indent="0" algn="l" rtl="0">
               <a:spcBef>
                 <a:spcPts val="600"/>
@@ -9439,394 +9879,7 @@
               </a:spcAft>
               <a:buNone/>
             </a:pPr>
-            <a:r>
-              <a:rPr lang="pt-BR" sz="900" dirty="0"/>
-              <a:t>- Observer Pattern;</a:t>
-            </a:r>
-          </a:p>
-          <a:p>
-            <a:pPr marL="0" lvl="0" indent="0" algn="l" rtl="0">
-              <a:spcBef>
-                <a:spcPts val="600"/>
-              </a:spcBef>
-              <a:spcAft>
-                <a:spcPts val="0"/>
-              </a:spcAft>
-              <a:buNone/>
-            </a:pPr>
-            <a:r>
-              <a:rPr lang="pt-BR" sz="900" dirty="0"/>
-              <a:t>---------------------</a:t>
-            </a:r>
-          </a:p>
-          <a:p>
-            <a:pPr marL="0" lvl="0" indent="0" algn="l" rtl="0">
-              <a:spcBef>
-                <a:spcPts val="600"/>
-              </a:spcBef>
-              <a:spcAft>
-                <a:spcPts val="0"/>
-              </a:spcAft>
-              <a:buNone/>
-            </a:pPr>
-            <a:r>
-              <a:rPr lang="pt-BR" sz="900" dirty="0"/>
-              <a:t>- Repository Pattern;</a:t>
-            </a:r>
-          </a:p>
-          <a:p>
-            <a:pPr marL="0" lvl="0" indent="0" algn="l" rtl="0">
-              <a:spcBef>
-                <a:spcPts val="600"/>
-              </a:spcBef>
-              <a:spcAft>
-                <a:spcPts val="0"/>
-              </a:spcAft>
-              <a:buNone/>
-            </a:pPr>
-            <a:r>
-              <a:rPr lang="pt-BR" sz="900" dirty="0"/>
-              <a:t>- </a:t>
-            </a:r>
-            <a:r>
-              <a:rPr lang="pt-BR" sz="900" dirty="0" err="1"/>
-              <a:t>UnitOfWork</a:t>
-            </a:r>
-            <a:r>
-              <a:rPr lang="pt-BR" sz="900" dirty="0"/>
-              <a:t> Pattern - (I do </a:t>
-            </a:r>
-            <a:r>
-              <a:rPr lang="pt-BR" sz="900" dirty="0" err="1"/>
-              <a:t>SOLID</a:t>
-            </a:r>
-            <a:r>
-              <a:rPr lang="pt-BR" sz="900" dirty="0"/>
-              <a:t>);</a:t>
-            </a:r>
-          </a:p>
-          <a:p>
-            <a:pPr marL="0" lvl="0" indent="0" algn="l" rtl="0">
-              <a:spcBef>
-                <a:spcPts val="600"/>
-              </a:spcBef>
-              <a:spcAft>
-                <a:spcPts val="0"/>
-              </a:spcAft>
-              <a:buNone/>
-            </a:pPr>
-            <a:r>
-              <a:rPr lang="pt-BR" sz="900" dirty="0"/>
-              <a:t>- </a:t>
-            </a:r>
-            <a:r>
-              <a:rPr lang="pt-BR" sz="900" dirty="0" err="1"/>
-              <a:t>FluentApi</a:t>
-            </a:r>
-            <a:r>
-              <a:rPr lang="pt-BR" sz="900" dirty="0"/>
-              <a:t> com </a:t>
-            </a:r>
-            <a:r>
-              <a:rPr lang="pt-BR" sz="900" dirty="0" err="1"/>
-              <a:t>EntityTypeConfiguration</a:t>
-            </a:r>
-            <a:r>
-              <a:rPr lang="pt-BR" sz="900" dirty="0"/>
-              <a:t>;</a:t>
-            </a:r>
-          </a:p>
-          <a:p>
-            <a:pPr marL="0" lvl="0" indent="0" algn="l" rtl="0">
-              <a:spcBef>
-                <a:spcPts val="600"/>
-              </a:spcBef>
-              <a:spcAft>
-                <a:spcPts val="0"/>
-              </a:spcAft>
-              <a:buNone/>
-            </a:pPr>
-            <a:r>
-              <a:rPr lang="pt-BR" sz="900" dirty="0"/>
-              <a:t>- </a:t>
-            </a:r>
-            <a:r>
-              <a:rPr lang="pt-BR" sz="900" dirty="0" err="1"/>
-              <a:t>ApplyConfigurationFromAssembly</a:t>
-            </a:r>
-            <a:r>
-              <a:rPr lang="pt-BR" sz="900" dirty="0"/>
-              <a:t> para unificar Mappings das </a:t>
-            </a:r>
-            <a:r>
-              <a:rPr lang="pt-BR" sz="900" dirty="0" err="1"/>
-              <a:t>Entties</a:t>
-            </a:r>
-            <a:r>
-              <a:rPr lang="pt-BR" sz="900" dirty="0"/>
-              <a:t>;</a:t>
-            </a:r>
-          </a:p>
-          <a:p>
-            <a:pPr marL="0" lvl="0" indent="0" algn="l" rtl="0">
-              <a:spcBef>
-                <a:spcPts val="600"/>
-              </a:spcBef>
-              <a:spcAft>
-                <a:spcPts val="0"/>
-              </a:spcAft>
-              <a:buNone/>
-            </a:pPr>
-            <a:r>
-              <a:rPr lang="pt-BR" sz="900" dirty="0"/>
-              <a:t>- </a:t>
-            </a:r>
-            <a:r>
-              <a:rPr lang="pt-BR" sz="900" dirty="0" err="1"/>
-              <a:t>Overide</a:t>
-            </a:r>
-            <a:r>
-              <a:rPr lang="pt-BR" sz="900" dirty="0"/>
-              <a:t> </a:t>
-            </a:r>
-            <a:r>
-              <a:rPr lang="pt-BR" sz="900" dirty="0" err="1"/>
-              <a:t>ConfigureConventions</a:t>
-            </a:r>
-            <a:r>
-              <a:rPr lang="pt-BR" sz="900" dirty="0"/>
-              <a:t>; - (Polimorfismo);</a:t>
-            </a:r>
-          </a:p>
-          <a:p>
-            <a:pPr marL="0" lvl="0" indent="0" algn="l" rtl="0">
-              <a:spcBef>
-                <a:spcPts val="600"/>
-              </a:spcBef>
-              <a:spcAft>
-                <a:spcPts val="0"/>
-              </a:spcAft>
-              <a:buNone/>
-            </a:pPr>
-            <a:r>
-              <a:rPr lang="pt-BR" sz="900" dirty="0"/>
-              <a:t>- Services: Pedido, Email. SMS e WhatsApp;</a:t>
-            </a:r>
-          </a:p>
-          <a:p>
-            <a:pPr marL="0" lvl="0" indent="0" algn="l" rtl="0">
-              <a:spcBef>
-                <a:spcPts val="600"/>
-              </a:spcBef>
-              <a:spcAft>
-                <a:spcPts val="0"/>
-              </a:spcAft>
-              <a:buNone/>
-            </a:pPr>
-            <a:r>
-              <a:rPr lang="pt-BR" sz="900" dirty="0"/>
-              <a:t>- </a:t>
-            </a:r>
-            <a:r>
-              <a:rPr lang="pt-BR" sz="900" dirty="0" err="1"/>
-              <a:t>Viewcomponent</a:t>
-            </a:r>
-            <a:r>
-              <a:rPr lang="pt-BR" sz="900" dirty="0"/>
-              <a:t> com </a:t>
-            </a:r>
-            <a:r>
-              <a:rPr lang="pt-BR" sz="900" dirty="0" err="1"/>
-              <a:t>TagHelp</a:t>
-            </a:r>
-            <a:r>
-              <a:rPr lang="pt-BR" sz="900" dirty="0"/>
-              <a:t> Personalizada - (</a:t>
-            </a:r>
-            <a:r>
-              <a:rPr lang="pt-BR" sz="900" dirty="0" err="1"/>
-              <a:t>DRY</a:t>
-            </a:r>
-            <a:r>
-              <a:rPr lang="pt-BR" sz="900" dirty="0"/>
-              <a:t> - </a:t>
-            </a:r>
-            <a:r>
-              <a:rPr lang="pt-BR" sz="900" dirty="0" err="1"/>
-              <a:t>Don't</a:t>
-            </a:r>
-            <a:r>
-              <a:rPr lang="pt-BR" sz="900" dirty="0"/>
-              <a:t> </a:t>
-            </a:r>
-            <a:r>
-              <a:rPr lang="pt-BR" sz="900" dirty="0" err="1"/>
-              <a:t>Reapete</a:t>
-            </a:r>
-            <a:r>
-              <a:rPr lang="pt-BR" sz="900" dirty="0"/>
-              <a:t> </a:t>
-            </a:r>
-            <a:r>
-              <a:rPr lang="pt-BR" sz="900" dirty="0" err="1"/>
-              <a:t>Yourserf</a:t>
-            </a:r>
-            <a:r>
-              <a:rPr lang="pt-BR" sz="900" dirty="0"/>
-              <a:t>);</a:t>
-            </a:r>
-          </a:p>
-          <a:p>
-            <a:pPr marL="0" lvl="0" indent="0" algn="l" rtl="0">
-              <a:spcBef>
-                <a:spcPts val="600"/>
-              </a:spcBef>
-              <a:spcAft>
-                <a:spcPts val="0"/>
-              </a:spcAft>
-              <a:buNone/>
-            </a:pPr>
-            <a:r>
-              <a:rPr lang="pt-BR" sz="900" dirty="0"/>
-              <a:t>- Configuração de Ambientes e </a:t>
-            </a:r>
-            <a:r>
-              <a:rPr lang="pt-BR" sz="900" dirty="0" err="1"/>
-              <a:t>User</a:t>
-            </a:r>
-            <a:r>
-              <a:rPr lang="pt-BR" sz="900" dirty="0"/>
-              <a:t> Secrets  - (S do </a:t>
-            </a:r>
-            <a:r>
-              <a:rPr lang="pt-BR" sz="900" dirty="0" err="1"/>
-              <a:t>Solid</a:t>
-            </a:r>
-            <a:r>
-              <a:rPr lang="pt-BR" sz="900" dirty="0"/>
-              <a:t>);</a:t>
-            </a:r>
-          </a:p>
-          <a:p>
-            <a:pPr marL="0" lvl="0" indent="0" algn="l" rtl="0">
-              <a:spcBef>
-                <a:spcPts val="600"/>
-              </a:spcBef>
-              <a:spcAft>
-                <a:spcPts val="0"/>
-              </a:spcAft>
-              <a:buNone/>
-            </a:pPr>
-            <a:r>
-              <a:rPr lang="pt-BR" sz="900" dirty="0"/>
-              <a:t>- </a:t>
-            </a:r>
-            <a:r>
-              <a:rPr lang="pt-BR" sz="900" dirty="0" err="1"/>
-              <a:t>DataTables</a:t>
-            </a:r>
-            <a:r>
-              <a:rPr lang="pt-BR" sz="900" dirty="0"/>
-              <a:t> com Bootstrap 5.1.3 - (Ferramentas Externas);</a:t>
-            </a:r>
-          </a:p>
-          <a:p>
-            <a:pPr marL="0" lvl="0" indent="0" algn="l" rtl="0">
-              <a:spcBef>
-                <a:spcPts val="600"/>
-              </a:spcBef>
-              <a:spcAft>
-                <a:spcPts val="0"/>
-              </a:spcAft>
-              <a:buNone/>
-            </a:pPr>
-            <a:r>
-              <a:rPr lang="pt-BR" sz="900" dirty="0"/>
-              <a:t>- Notificações no Menu </a:t>
-            </a:r>
-            <a:r>
-              <a:rPr lang="pt-BR" sz="900" dirty="0" err="1"/>
-              <a:t>DropDown</a:t>
-            </a:r>
-            <a:r>
-              <a:rPr lang="pt-BR" sz="900" dirty="0"/>
-              <a:t> - (</a:t>
-            </a:r>
-            <a:r>
-              <a:rPr lang="pt-BR" sz="900" dirty="0" err="1"/>
-              <a:t>Notification</a:t>
-            </a:r>
-            <a:r>
-              <a:rPr lang="pt-BR" sz="900" dirty="0"/>
-              <a:t> Pattern);</a:t>
-            </a:r>
-          </a:p>
-          <a:p>
-            <a:pPr marL="0" lvl="0" indent="0" algn="l" rtl="0">
-              <a:spcBef>
-                <a:spcPts val="600"/>
-              </a:spcBef>
-              <a:spcAft>
-                <a:spcPts val="0"/>
-              </a:spcAft>
-              <a:buNone/>
-            </a:pPr>
-            <a:r>
-              <a:rPr lang="pt-BR" sz="900" dirty="0"/>
-              <a:t>- </a:t>
-            </a:r>
-            <a:r>
-              <a:rPr lang="pt-BR" sz="900" dirty="0" err="1"/>
-              <a:t>Enun</a:t>
-            </a:r>
-            <a:r>
-              <a:rPr lang="pt-BR" sz="900" dirty="0"/>
-              <a:t> Extension - Extension Method - O do </a:t>
-            </a:r>
-            <a:r>
-              <a:rPr lang="pt-BR" sz="900" dirty="0" err="1"/>
-              <a:t>SOLID</a:t>
-            </a:r>
             <a:endParaRPr lang="pt-BR" sz="900" dirty="0"/>
-          </a:p>
-          <a:p>
-            <a:pPr marL="0" lvl="0" indent="0" algn="l" rtl="0">
-              <a:spcBef>
-                <a:spcPts val="600"/>
-              </a:spcBef>
-              <a:spcAft>
-                <a:spcPts val="0"/>
-              </a:spcAft>
-              <a:buNone/>
-            </a:pPr>
-            <a:r>
-              <a:rPr lang="pt-BR" sz="900" dirty="0"/>
-              <a:t>- </a:t>
-            </a:r>
-            <a:r>
-              <a:rPr lang="pt-BR" sz="900" dirty="0" err="1"/>
-              <a:t>Dependence</a:t>
-            </a:r>
-            <a:r>
-              <a:rPr lang="pt-BR" sz="900" dirty="0"/>
-              <a:t> </a:t>
-            </a:r>
-            <a:r>
-              <a:rPr lang="pt-BR" sz="900" dirty="0" err="1"/>
-              <a:t>Inject</a:t>
-            </a:r>
-            <a:r>
-              <a:rPr lang="pt-BR" sz="900" dirty="0"/>
-              <a:t>; - (D do </a:t>
-            </a:r>
-            <a:r>
-              <a:rPr lang="pt-BR" sz="900" dirty="0" err="1"/>
-              <a:t>SOLID</a:t>
-            </a:r>
-            <a:r>
-              <a:rPr lang="pt-BR" sz="900" dirty="0"/>
-              <a:t>);</a:t>
-            </a:r>
           </a:p>
         </p:txBody>
       </p:sp>
@@ -9874,492 +9927,520 @@
       </p:sp>
       <p:sp>
         <p:nvSpPr>
-          <p:cNvPr id="13" name="CaixaDeTexto 12">
+          <p:cNvPr id="14" name="Google Shape;303;p31">
             <a:extLst>
               <a:ext uri="{FF2B5EF4-FFF2-40B4-BE49-F238E27FC236}">
-                <a16:creationId xmlns:a16="http://schemas.microsoft.com/office/drawing/2014/main" id="{0DD248C4-1AC9-DB5A-ADD4-30B974DF531D}"/>
+                <a16:creationId xmlns:a16="http://schemas.microsoft.com/office/drawing/2014/main" id="{6E771983-3B6B-31F2-11F9-823DCDE4C3A7}"/>
               </a:ext>
             </a:extLst>
           </p:cNvPr>
-          <p:cNvSpPr txBox="1"/>
+          <p:cNvSpPr txBox="1">
+            <a:spLocks/>
+          </p:cNvSpPr>
           <p:nvPr/>
         </p:nvSpPr>
         <p:spPr>
           <a:xfrm>
-            <a:off x="5079534" y="948810"/>
-            <a:ext cx="3645016" cy="3308598"/>
+            <a:off x="4986168" y="1056617"/>
+            <a:ext cx="3950837" cy="3030265"/>
           </a:xfrm>
           <a:prstGeom prst="rect">
             <a:avLst/>
           </a:prstGeom>
           <a:noFill/>
+          <a:ln>
+            <a:noFill/>
+          </a:ln>
         </p:spPr>
         <p:txBody>
-          <a:bodyPr wrap="square">
-            <a:spAutoFit/>
+          <a:bodyPr spcFirstLastPara="1" wrap="square" lIns="0" tIns="0" rIns="0" bIns="0" anchor="t" anchorCtr="0">
+            <a:noAutofit/>
           </a:bodyPr>
-          <a:lstStyle/>
-          <a:p>
-            <a:pPr marL="0" lvl="0" indent="0" algn="l" rtl="0">
+          <a:lstStyle>
+            <a:defPPr marR="0" lvl="0" algn="l" rtl="0">
+              <a:lnSpc>
+                <a:spcPct val="100000"/>
+              </a:lnSpc>
+              <a:spcBef>
+                <a:spcPts val="0"/>
+              </a:spcBef>
+              <a:spcAft>
+                <a:spcPts val="0"/>
+              </a:spcAft>
+            </a:defPPr>
+            <a:lvl1pPr marL="457200" marR="0" lvl="0" indent="-330200" algn="l" rtl="0">
+              <a:lnSpc>
+                <a:spcPct val="115000"/>
+              </a:lnSpc>
               <a:spcBef>
                 <a:spcPts val="600"/>
               </a:spcBef>
               <a:spcAft>
                 <a:spcPts val="0"/>
               </a:spcAft>
-              <a:buNone/>
+              <a:buClr>
+                <a:schemeClr val="accent5"/>
+              </a:buClr>
+              <a:buSzPts val="1600"/>
+              <a:buFont typeface="Muli Light"/>
+              <a:buChar char="⬡"/>
+              <a:defRPr sz="1600" b="0" i="0" u="none" strike="noStrike" cap="none">
+                <a:solidFill>
+                  <a:schemeClr val="lt1"/>
+                </a:solidFill>
+                <a:latin typeface="Muli Light"/>
+                <a:ea typeface="Muli Light"/>
+                <a:cs typeface="Muli Light"/>
+                <a:sym typeface="Muli Light"/>
+              </a:defRPr>
+            </a:lvl1pPr>
+            <a:lvl2pPr marL="914400" marR="0" lvl="1" indent="-330200" algn="l" rtl="0">
+              <a:lnSpc>
+                <a:spcPct val="115000"/>
+              </a:lnSpc>
+              <a:spcBef>
+                <a:spcPts val="0"/>
+              </a:spcBef>
+              <a:spcAft>
+                <a:spcPts val="0"/>
+              </a:spcAft>
+              <a:buClr>
+                <a:schemeClr val="accent5"/>
+              </a:buClr>
+              <a:buSzPts val="1600"/>
+              <a:buFont typeface="Muli Light"/>
+              <a:buChar char="∙"/>
+              <a:defRPr sz="1600" b="0" i="0" u="none" strike="noStrike" cap="none">
+                <a:solidFill>
+                  <a:schemeClr val="lt1"/>
+                </a:solidFill>
+                <a:latin typeface="Muli Light"/>
+                <a:ea typeface="Muli Light"/>
+                <a:cs typeface="Muli Light"/>
+                <a:sym typeface="Muli Light"/>
+              </a:defRPr>
+            </a:lvl2pPr>
+            <a:lvl3pPr marL="1371600" marR="0" lvl="2" indent="-330200" algn="l" rtl="0">
+              <a:lnSpc>
+                <a:spcPct val="115000"/>
+              </a:lnSpc>
+              <a:spcBef>
+                <a:spcPts val="0"/>
+              </a:spcBef>
+              <a:spcAft>
+                <a:spcPts val="0"/>
+              </a:spcAft>
+              <a:buClr>
+                <a:schemeClr val="accent5"/>
+              </a:buClr>
+              <a:buSzPts val="1600"/>
+              <a:buFont typeface="Muli Light"/>
+              <a:buChar char="∙"/>
+              <a:defRPr sz="1600" b="0" i="0" u="none" strike="noStrike" cap="none">
+                <a:solidFill>
+                  <a:schemeClr val="lt1"/>
+                </a:solidFill>
+                <a:latin typeface="Muli Light"/>
+                <a:ea typeface="Muli Light"/>
+                <a:cs typeface="Muli Light"/>
+                <a:sym typeface="Muli Light"/>
+              </a:defRPr>
+            </a:lvl3pPr>
+            <a:lvl4pPr marL="1828800" marR="0" lvl="3" indent="-330200" algn="l" rtl="0">
+              <a:lnSpc>
+                <a:spcPct val="115000"/>
+              </a:lnSpc>
+              <a:spcBef>
+                <a:spcPts val="0"/>
+              </a:spcBef>
+              <a:spcAft>
+                <a:spcPts val="0"/>
+              </a:spcAft>
+              <a:buClr>
+                <a:schemeClr val="lt1"/>
+              </a:buClr>
+              <a:buSzPts val="1600"/>
+              <a:buFont typeface="Muli Light"/>
+              <a:buChar char="●"/>
+              <a:defRPr sz="1600" b="0" i="0" u="none" strike="noStrike" cap="none">
+                <a:solidFill>
+                  <a:schemeClr val="lt1"/>
+                </a:solidFill>
+                <a:latin typeface="Muli Light"/>
+                <a:ea typeface="Muli Light"/>
+                <a:cs typeface="Muli Light"/>
+                <a:sym typeface="Muli Light"/>
+              </a:defRPr>
+            </a:lvl4pPr>
+            <a:lvl5pPr marL="2286000" marR="0" lvl="4" indent="-330200" algn="l" rtl="0">
+              <a:lnSpc>
+                <a:spcPct val="115000"/>
+              </a:lnSpc>
+              <a:spcBef>
+                <a:spcPts val="0"/>
+              </a:spcBef>
+              <a:spcAft>
+                <a:spcPts val="0"/>
+              </a:spcAft>
+              <a:buClr>
+                <a:schemeClr val="lt1"/>
+              </a:buClr>
+              <a:buSzPts val="1600"/>
+              <a:buFont typeface="Muli Light"/>
+              <a:buChar char="○"/>
+              <a:defRPr sz="1600" b="0" i="0" u="none" strike="noStrike" cap="none">
+                <a:solidFill>
+                  <a:schemeClr val="lt1"/>
+                </a:solidFill>
+                <a:latin typeface="Muli Light"/>
+                <a:ea typeface="Muli Light"/>
+                <a:cs typeface="Muli Light"/>
+                <a:sym typeface="Muli Light"/>
+              </a:defRPr>
+            </a:lvl5pPr>
+            <a:lvl6pPr marL="2743200" marR="0" lvl="5" indent="-330200" algn="l" rtl="0">
+              <a:lnSpc>
+                <a:spcPct val="115000"/>
+              </a:lnSpc>
+              <a:spcBef>
+                <a:spcPts val="0"/>
+              </a:spcBef>
+              <a:spcAft>
+                <a:spcPts val="0"/>
+              </a:spcAft>
+              <a:buClr>
+                <a:schemeClr val="lt1"/>
+              </a:buClr>
+              <a:buSzPts val="1600"/>
+              <a:buFont typeface="Muli Light"/>
+              <a:buChar char="■"/>
+              <a:defRPr sz="1600" b="0" i="0" u="none" strike="noStrike" cap="none">
+                <a:solidFill>
+                  <a:schemeClr val="lt1"/>
+                </a:solidFill>
+                <a:latin typeface="Muli Light"/>
+                <a:ea typeface="Muli Light"/>
+                <a:cs typeface="Muli Light"/>
+                <a:sym typeface="Muli Light"/>
+              </a:defRPr>
+            </a:lvl6pPr>
+            <a:lvl7pPr marL="3200400" marR="0" lvl="6" indent="-330200" algn="l" rtl="0">
+              <a:lnSpc>
+                <a:spcPct val="115000"/>
+              </a:lnSpc>
+              <a:spcBef>
+                <a:spcPts val="0"/>
+              </a:spcBef>
+              <a:spcAft>
+                <a:spcPts val="0"/>
+              </a:spcAft>
+              <a:buClr>
+                <a:schemeClr val="lt1"/>
+              </a:buClr>
+              <a:buSzPts val="1600"/>
+              <a:buFont typeface="Muli Light"/>
+              <a:buChar char="●"/>
+              <a:defRPr sz="1600" b="0" i="0" u="none" strike="noStrike" cap="none">
+                <a:solidFill>
+                  <a:schemeClr val="lt1"/>
+                </a:solidFill>
+                <a:latin typeface="Muli Light"/>
+                <a:ea typeface="Muli Light"/>
+                <a:cs typeface="Muli Light"/>
+                <a:sym typeface="Muli Light"/>
+              </a:defRPr>
+            </a:lvl7pPr>
+            <a:lvl8pPr marL="3657600" marR="0" lvl="7" indent="-330200" algn="l" rtl="0">
+              <a:lnSpc>
+                <a:spcPct val="115000"/>
+              </a:lnSpc>
+              <a:spcBef>
+                <a:spcPts val="0"/>
+              </a:spcBef>
+              <a:spcAft>
+                <a:spcPts val="0"/>
+              </a:spcAft>
+              <a:buClr>
+                <a:schemeClr val="lt1"/>
+              </a:buClr>
+              <a:buSzPts val="1600"/>
+              <a:buFont typeface="Muli Light"/>
+              <a:buChar char="○"/>
+              <a:defRPr sz="1600" b="0" i="0" u="none" strike="noStrike" cap="none">
+                <a:solidFill>
+                  <a:schemeClr val="lt1"/>
+                </a:solidFill>
+                <a:latin typeface="Muli Light"/>
+                <a:ea typeface="Muli Light"/>
+                <a:cs typeface="Muli Light"/>
+                <a:sym typeface="Muli Light"/>
+              </a:defRPr>
+            </a:lvl8pPr>
+            <a:lvl9pPr marL="4114800" marR="0" lvl="8" indent="-330200" algn="l" rtl="0">
+              <a:lnSpc>
+                <a:spcPct val="115000"/>
+              </a:lnSpc>
+              <a:spcBef>
+                <a:spcPts val="0"/>
+              </a:spcBef>
+              <a:spcAft>
+                <a:spcPts val="0"/>
+              </a:spcAft>
+              <a:buClr>
+                <a:schemeClr val="lt1"/>
+              </a:buClr>
+              <a:buSzPts val="1600"/>
+              <a:buFont typeface="Muli Light"/>
+              <a:buChar char="■"/>
+              <a:defRPr sz="1600" b="0" i="0" u="none" strike="noStrike" cap="none">
+                <a:solidFill>
+                  <a:schemeClr val="lt1"/>
+                </a:solidFill>
+                <a:latin typeface="Muli Light"/>
+                <a:ea typeface="Muli Light"/>
+                <a:cs typeface="Muli Light"/>
+                <a:sym typeface="Muli Light"/>
+              </a:defRPr>
+            </a:lvl9pPr>
+          </a:lstStyle>
+          <a:p>
+            <a:pPr marL="171450" indent="-171450">
+              <a:buFont typeface="Wingdings" panose="05000000000000000000" pitchFamily="2" charset="2"/>
+              <a:buChar char="ü"/>
             </a:pPr>
             <a:r>
-              <a:rPr lang="pt-BR" sz="1050" dirty="0">
+              <a:rPr lang="pt-BR" sz="900" dirty="0">
                 <a:solidFill>
                   <a:schemeClr val="bg1"/>
                 </a:solidFill>
+                <a:latin typeface="Muli Light" panose="020B0604020202020204" charset="0"/>
               </a:rPr>
-              <a:t>- Persistir dados;</a:t>
-            </a:r>
-          </a:p>
-          <a:p>
-            <a:pPr marL="0" lvl="0" indent="0" algn="l" rtl="0">
-              <a:spcBef>
-                <a:spcPts val="600"/>
-              </a:spcBef>
-              <a:spcAft>
-                <a:spcPts val="0"/>
-              </a:spcAft>
-              <a:buNone/>
+              <a:t>IoC com Dependency Injection; - (D do SOLID);</a:t>
+            </a:r>
+          </a:p>
+          <a:p>
+            <a:pPr marL="171450" indent="-171450">
+              <a:buFont typeface="Wingdings" panose="05000000000000000000" pitchFamily="2" charset="2"/>
+              <a:buChar char="ü"/>
             </a:pPr>
             <a:r>
-              <a:rPr lang="pt-BR" sz="1050" dirty="0">
+              <a:rPr lang="pt-BR" sz="1000" dirty="0">
                 <a:solidFill>
                   <a:schemeClr val="bg1"/>
                 </a:solidFill>
+                <a:latin typeface="Muli Light" panose="020B0604020202020204" charset="0"/>
               </a:rPr>
-              <a:t>- Mensagem de Sucesso e Erro com </a:t>
-            </a:r>
-            <a:r>
-              <a:rPr lang="pt-BR" sz="1050" dirty="0" err="1">
+              <a:t>Persistir dados;</a:t>
+            </a:r>
+          </a:p>
+          <a:p>
+            <a:pPr marL="171450" indent="-171450">
+              <a:buFont typeface="Wingdings" panose="05000000000000000000" pitchFamily="2" charset="2"/>
+              <a:buChar char="ü"/>
+            </a:pPr>
+            <a:r>
+              <a:rPr lang="pt-BR" sz="1000" dirty="0">
                 <a:solidFill>
                   <a:schemeClr val="bg1"/>
                 </a:solidFill>
+                <a:latin typeface="Muli Light" panose="020B0604020202020204" charset="0"/>
               </a:rPr>
-              <a:t>ViewComponents</a:t>
-            </a:r>
-            <a:r>
-              <a:rPr lang="pt-BR" sz="1050" dirty="0">
+              <a:t>Mensagem de Sucesso e Erro com ViewComponents;</a:t>
+            </a:r>
+          </a:p>
+          <a:p>
+            <a:pPr marL="171450" indent="-171450">
+              <a:buFont typeface="Wingdings" panose="05000000000000000000" pitchFamily="2" charset="2"/>
+              <a:buChar char="ü"/>
+            </a:pPr>
+            <a:r>
+              <a:rPr lang="pt-BR" sz="900" dirty="0">
                 <a:solidFill>
                   <a:schemeClr val="bg1"/>
                 </a:solidFill>
+                <a:latin typeface="Muli Light" panose="020B0604020202020204" charset="0"/>
               </a:rPr>
-              <a:t>;</a:t>
-            </a:r>
-          </a:p>
-          <a:p>
-            <a:pPr marL="0" lvl="0" indent="0" algn="l" rtl="0">
-              <a:spcBef>
-                <a:spcPts val="600"/>
-              </a:spcBef>
-              <a:spcAft>
-                <a:spcPts val="0"/>
-              </a:spcAft>
-              <a:buNone/>
+              <a:t>ViewModel - (DTO com mais de uma Model) - (MVVM e DTO);</a:t>
+            </a:r>
+          </a:p>
+          <a:p>
+            <a:pPr marL="171450" indent="-171450">
+              <a:buFont typeface="Wingdings" panose="05000000000000000000" pitchFamily="2" charset="2"/>
+              <a:buChar char="ü"/>
             </a:pPr>
             <a:r>
-              <a:rPr lang="pt-BR" sz="1050" dirty="0">
+              <a:rPr lang="pt-BR" sz="900" dirty="0">
                 <a:solidFill>
                   <a:schemeClr val="bg1"/>
                 </a:solidFill>
+                <a:latin typeface="Muli Light" panose="020B0604020202020204" charset="0"/>
               </a:rPr>
-              <a:t>- </a:t>
-            </a:r>
-            <a:r>
-              <a:rPr lang="pt-BR" sz="1050" dirty="0" err="1">
+              <a:t>FactoryMessageViewModel static Method in "Helper static Class";</a:t>
+            </a:r>
+          </a:p>
+          <a:p>
+            <a:pPr marL="171450" indent="-171450">
+              <a:buFont typeface="Wingdings" panose="05000000000000000000" pitchFamily="2" charset="2"/>
+              <a:buChar char="ü"/>
+            </a:pPr>
+            <a:r>
+              <a:rPr lang="pt-BR" sz="900" dirty="0">
                 <a:solidFill>
                   <a:schemeClr val="bg1"/>
                 </a:solidFill>
+                <a:latin typeface="Muli Light" panose="020B0604020202020204" charset="0"/>
               </a:rPr>
-              <a:t>ViewModel</a:t>
-            </a:r>
-            <a:r>
-              <a:rPr lang="pt-BR" sz="1050" dirty="0">
+              <a:t>MVC Pattern;</a:t>
+            </a:r>
+            <a:br>
+              <a:rPr lang="pt-BR" sz="900" dirty="0">
                 <a:solidFill>
                   <a:schemeClr val="bg1"/>
                 </a:solidFill>
+                <a:latin typeface="Muli Light" panose="020B0604020202020204" charset="0"/>
               </a:rPr>
-              <a:t> - </a:t>
-            </a:r>
-            <a:r>
-              <a:rPr lang="pt-BR" sz="1050" dirty="0" err="1">
-                <a:solidFill>
-                  <a:schemeClr val="bg1"/>
-                </a:solidFill>
-              </a:rPr>
-              <a:t>MensagemViewModel</a:t>
-            </a:r>
-            <a:r>
-              <a:rPr lang="pt-BR" sz="1050" dirty="0">
-                <a:solidFill>
-                  <a:schemeClr val="bg1"/>
-                </a:solidFill>
-              </a:rPr>
-              <a:t> - (</a:t>
-            </a:r>
-            <a:r>
-              <a:rPr lang="pt-BR" sz="1050" dirty="0" err="1">
-                <a:solidFill>
-                  <a:schemeClr val="bg1"/>
-                </a:solidFill>
-              </a:rPr>
-              <a:t>DTO</a:t>
-            </a:r>
-            <a:r>
-              <a:rPr lang="pt-BR" sz="1050" dirty="0">
-                <a:solidFill>
-                  <a:schemeClr val="bg1"/>
-                </a:solidFill>
-              </a:rPr>
-              <a:t> com mais de uma Model) - (MVVM e </a:t>
-            </a:r>
-            <a:r>
-              <a:rPr lang="pt-BR" sz="1050" dirty="0" err="1">
-                <a:solidFill>
-                  <a:schemeClr val="bg1"/>
-                </a:solidFill>
-              </a:rPr>
-              <a:t>DTO</a:t>
-            </a:r>
-            <a:r>
-              <a:rPr lang="pt-BR" sz="1050" dirty="0">
-                <a:solidFill>
-                  <a:schemeClr val="bg1"/>
-                </a:solidFill>
-              </a:rPr>
-              <a:t>);</a:t>
-            </a:r>
-          </a:p>
-          <a:p>
-            <a:pPr marL="0" lvl="0" indent="0" algn="l" rtl="0">
-              <a:spcBef>
-                <a:spcPts val="600"/>
-              </a:spcBef>
-              <a:spcAft>
-                <a:spcPts val="0"/>
-              </a:spcAft>
-              <a:buNone/>
-            </a:pPr>
-            <a:r>
-              <a:rPr lang="pt-BR" sz="1050" dirty="0">
-                <a:solidFill>
-                  <a:schemeClr val="bg1"/>
-                </a:solidFill>
-              </a:rPr>
-              <a:t>- </a:t>
-            </a:r>
-            <a:r>
-              <a:rPr lang="pt-BR" sz="1050" dirty="0" err="1">
-                <a:solidFill>
-                  <a:schemeClr val="bg1"/>
-                </a:solidFill>
-              </a:rPr>
-              <a:t>FactorMessageViewModel</a:t>
-            </a:r>
-            <a:r>
-              <a:rPr lang="pt-BR" sz="1050" dirty="0">
-                <a:solidFill>
-                  <a:schemeClr val="bg1"/>
-                </a:solidFill>
-              </a:rPr>
-              <a:t> </a:t>
-            </a:r>
-            <a:r>
-              <a:rPr lang="pt-BR" sz="1050" dirty="0" err="1">
-                <a:solidFill>
-                  <a:schemeClr val="bg1"/>
-                </a:solidFill>
-              </a:rPr>
-              <a:t>static</a:t>
-            </a:r>
-            <a:r>
-              <a:rPr lang="pt-BR" sz="1050" dirty="0">
-                <a:solidFill>
-                  <a:schemeClr val="bg1"/>
-                </a:solidFill>
-              </a:rPr>
-              <a:t> Method in "</a:t>
-            </a:r>
-            <a:r>
-              <a:rPr lang="pt-BR" sz="1050" dirty="0" err="1">
-                <a:solidFill>
-                  <a:schemeClr val="bg1"/>
-                </a:solidFill>
-              </a:rPr>
-              <a:t>Helper</a:t>
-            </a:r>
-            <a:r>
-              <a:rPr lang="pt-BR" sz="1050" dirty="0">
-                <a:solidFill>
-                  <a:schemeClr val="bg1"/>
-                </a:solidFill>
-              </a:rPr>
-              <a:t> </a:t>
-            </a:r>
-            <a:r>
-              <a:rPr lang="pt-BR" sz="1050" dirty="0" err="1">
-                <a:solidFill>
-                  <a:schemeClr val="bg1"/>
-                </a:solidFill>
-              </a:rPr>
-              <a:t>static</a:t>
-            </a:r>
-            <a:r>
-              <a:rPr lang="pt-BR" sz="1050" dirty="0">
-                <a:solidFill>
-                  <a:schemeClr val="bg1"/>
-                </a:solidFill>
-              </a:rPr>
-              <a:t> </a:t>
-            </a:r>
-            <a:r>
-              <a:rPr lang="pt-BR" sz="1050" dirty="0" err="1">
-                <a:solidFill>
-                  <a:schemeClr val="bg1"/>
-                </a:solidFill>
-              </a:rPr>
-              <a:t>Class</a:t>
-            </a:r>
-            <a:r>
-              <a:rPr lang="pt-BR" sz="1050" dirty="0">
-                <a:solidFill>
-                  <a:schemeClr val="bg1"/>
-                </a:solidFill>
-              </a:rPr>
-              <a:t>";</a:t>
-            </a:r>
-          </a:p>
-          <a:p>
-            <a:pPr marL="0" lvl="0" indent="0" algn="l" rtl="0">
-              <a:spcBef>
-                <a:spcPts val="600"/>
-              </a:spcBef>
-              <a:spcAft>
-                <a:spcPts val="0"/>
-              </a:spcAft>
-              <a:buNone/>
-            </a:pPr>
-            <a:r>
-              <a:rPr lang="pt-BR" sz="1050" dirty="0">
-                <a:solidFill>
-                  <a:schemeClr val="bg1"/>
-                </a:solidFill>
-              </a:rPr>
-              <a:t>- MVC Pattern;</a:t>
-            </a:r>
-          </a:p>
-          <a:p>
-            <a:pPr marL="0" lvl="0" indent="0" algn="l" rtl="0">
-              <a:spcBef>
-                <a:spcPts val="600"/>
-              </a:spcBef>
-              <a:spcAft>
-                <a:spcPts val="0"/>
-              </a:spcAft>
-              <a:buNone/>
-            </a:pPr>
-            <a:r>
-              <a:rPr lang="pt-BR" sz="1050" dirty="0">
-                <a:solidFill>
-                  <a:schemeClr val="bg1"/>
-                </a:solidFill>
-              </a:rPr>
-              <a:t>-------------------------------------------------</a:t>
-            </a:r>
-          </a:p>
-          <a:p>
-            <a:pPr marL="0" lvl="0" indent="0" algn="l" rtl="0">
-              <a:spcBef>
-                <a:spcPts val="600"/>
-              </a:spcBef>
-              <a:spcAft>
-                <a:spcPts val="0"/>
-              </a:spcAft>
-              <a:buNone/>
-            </a:pPr>
-            <a:r>
-              <a:rPr lang="pt-BR" sz="1050" dirty="0">
-                <a:solidFill>
-                  <a:schemeClr val="bg1"/>
-                </a:solidFill>
-              </a:rPr>
-              <a:t>EntityFramework Core - (</a:t>
-            </a:r>
-            <a:r>
-              <a:rPr lang="pt-BR" sz="1050" dirty="0" err="1">
-                <a:solidFill>
-                  <a:schemeClr val="bg1"/>
-                </a:solidFill>
-              </a:rPr>
-              <a:t>with</a:t>
-            </a:r>
-            <a:r>
-              <a:rPr lang="pt-BR" sz="1050" dirty="0">
-                <a:solidFill>
-                  <a:schemeClr val="bg1"/>
-                </a:solidFill>
-              </a:rPr>
-              <a:t> </a:t>
-            </a:r>
-            <a:r>
-              <a:rPr lang="pt-BR" sz="1050" dirty="0" err="1">
-                <a:solidFill>
-                  <a:schemeClr val="bg1"/>
-                </a:solidFill>
-              </a:rPr>
-              <a:t>Code</a:t>
-            </a:r>
-            <a:r>
-              <a:rPr lang="pt-BR" sz="1050" dirty="0">
-                <a:solidFill>
-                  <a:schemeClr val="bg1"/>
-                </a:solidFill>
-              </a:rPr>
-              <a:t> </a:t>
-            </a:r>
-            <a:r>
-              <a:rPr lang="pt-BR" sz="1050" dirty="0" err="1">
-                <a:solidFill>
-                  <a:schemeClr val="bg1"/>
-                </a:solidFill>
-              </a:rPr>
-              <a:t>First</a:t>
-            </a:r>
-            <a:r>
-              <a:rPr lang="pt-BR" sz="1050" dirty="0">
-                <a:solidFill>
-                  <a:schemeClr val="bg1"/>
-                </a:solidFill>
-              </a:rPr>
-              <a:t> Approach);</a:t>
-            </a:r>
-          </a:p>
-          <a:p>
-            <a:pPr marL="0" lvl="0" indent="0" algn="l" rtl="0">
-              <a:spcBef>
-                <a:spcPts val="600"/>
-              </a:spcBef>
-              <a:spcAft>
-                <a:spcPts val="0"/>
-              </a:spcAft>
-              <a:buNone/>
-            </a:pPr>
-            <a:endParaRPr lang="pt-BR" sz="1050" dirty="0">
+            </a:br>
+            <a:endParaRPr lang="pt-BR" sz="900" dirty="0">
               <a:solidFill>
                 <a:schemeClr val="bg1"/>
               </a:solidFill>
+              <a:latin typeface="Muli Light" panose="020B0604020202020204" charset="0"/>
             </a:endParaRPr>
           </a:p>
           <a:p>
-            <a:pPr marL="0" lvl="0" indent="0" algn="l" rtl="0">
-              <a:spcBef>
-                <a:spcPts val="600"/>
-              </a:spcBef>
-              <a:spcAft>
-                <a:spcPts val="0"/>
-              </a:spcAft>
+            <a:pPr marL="0" indent="0">
               <a:buNone/>
             </a:pPr>
-            <a:endParaRPr lang="pt-BR" sz="1050" dirty="0">
+            <a:br>
+              <a:rPr lang="pt-BR" sz="1200" b="1" u="sng" dirty="0">
+                <a:solidFill>
+                  <a:schemeClr val="bg1"/>
+                </a:solidFill>
+                <a:latin typeface="Muli Light" panose="020B0604020202020204" charset="0"/>
+              </a:rPr>
+            </a:br>
+            <a:r>
+              <a:rPr lang="pt-BR" sz="1200" b="1" u="sng" dirty="0">
+                <a:solidFill>
+                  <a:schemeClr val="bg1"/>
+                </a:solidFill>
+                <a:latin typeface="Muli Light" panose="020B0604020202020204" charset="0"/>
+              </a:rPr>
+              <a:t>Ferramentas e Tecnologias:</a:t>
+            </a:r>
+            <a:br>
+              <a:rPr lang="pt-BR" sz="1200" b="1" u="sng" dirty="0">
+                <a:solidFill>
+                  <a:schemeClr val="bg1"/>
+                </a:solidFill>
+                <a:latin typeface="Muli Light" panose="020B0604020202020204" charset="0"/>
+              </a:rPr>
+            </a:br>
+            <a:endParaRPr lang="pt-BR" sz="1200" b="1" u="sng" dirty="0">
               <a:solidFill>
                 <a:schemeClr val="bg1"/>
               </a:solidFill>
+              <a:latin typeface="Muli Light" panose="020B0604020202020204" charset="0"/>
             </a:endParaRPr>
           </a:p>
           <a:p>
-            <a:pPr marL="0" lvl="0" indent="0" algn="l" rtl="0">
-              <a:spcBef>
-                <a:spcPts val="600"/>
-              </a:spcBef>
-              <a:spcAft>
-                <a:spcPts val="0"/>
-              </a:spcAft>
-              <a:buNone/>
+            <a:pPr marL="171450" indent="-171450">
+              <a:buFont typeface="Wingdings" panose="05000000000000000000" pitchFamily="2" charset="2"/>
+              <a:buChar char="§"/>
             </a:pPr>
             <a:r>
-              <a:rPr lang="pt-BR" sz="1050" dirty="0">
+              <a:rPr lang="pt-BR" sz="1000" dirty="0">
                 <a:solidFill>
                   <a:schemeClr val="bg1"/>
                 </a:solidFill>
+                <a:latin typeface="Muli Light" panose="020B0604020202020204" charset="0"/>
               </a:rPr>
-              <a:t>Link </a:t>
-            </a:r>
-            <a:r>
-              <a:rPr lang="pt-BR" sz="1050" dirty="0" err="1">
+              <a:t>Visual Studio 2022;</a:t>
+            </a:r>
+          </a:p>
+          <a:p>
+            <a:pPr marL="171450" indent="-171450">
+              <a:buFont typeface="Wingdings" panose="05000000000000000000" pitchFamily="2" charset="2"/>
+              <a:buChar char="§"/>
+            </a:pPr>
+            <a:r>
+              <a:rPr lang="pt-BR" sz="1000" dirty="0">
                 <a:solidFill>
                   <a:schemeClr val="bg1"/>
                 </a:solidFill>
+                <a:latin typeface="Muli Light" panose="020B0604020202020204" charset="0"/>
               </a:rPr>
-              <a:t>Github</a:t>
-            </a:r>
-            <a:r>
-              <a:rPr lang="pt-BR" sz="1050" dirty="0">
+              <a:t>.Net 7 / Asp.Net Core 7;</a:t>
+            </a:r>
+          </a:p>
+          <a:p>
+            <a:pPr marL="171450" indent="-171450">
+              <a:buFont typeface="Wingdings" panose="05000000000000000000" pitchFamily="2" charset="2"/>
+              <a:buChar char="§"/>
+            </a:pPr>
+            <a:r>
+              <a:rPr lang="pt-BR" sz="1000" dirty="0">
                 <a:solidFill>
                   <a:schemeClr val="bg1"/>
                 </a:solidFill>
+                <a:latin typeface="Muli Light" panose="020B0604020202020204" charset="0"/>
               </a:rPr>
-              <a:t> (fonte)</a:t>
-            </a:r>
-          </a:p>
-          <a:p>
-            <a:pPr marL="0" lvl="0" indent="0" algn="l" rtl="0">
-              <a:spcBef>
-                <a:spcPts val="600"/>
-              </a:spcBef>
-              <a:spcAft>
-                <a:spcPts val="0"/>
-              </a:spcAft>
-              <a:buNone/>
+              <a:t>EntityFramework Core 7;</a:t>
+            </a:r>
+          </a:p>
+          <a:p>
+            <a:pPr marL="171450" indent="-171450">
+              <a:buFont typeface="Wingdings" panose="05000000000000000000" pitchFamily="2" charset="2"/>
+              <a:buChar char="§"/>
             </a:pPr>
             <a:r>
-              <a:rPr lang="pt-BR" sz="1050" dirty="0">
+              <a:rPr lang="pt-BR" sz="1000" dirty="0">
                 <a:solidFill>
                   <a:schemeClr val="bg1"/>
                 </a:solidFill>
+                <a:latin typeface="Muli Light" panose="020B0604020202020204" charset="0"/>
               </a:rPr>
-              <a:t>Link Telegram (Asp.Net Core </a:t>
-            </a:r>
-            <a:r>
-              <a:rPr lang="pt-BR" sz="1050" dirty="0" err="1">
-                <a:solidFill>
-                  <a:schemeClr val="bg1"/>
-                </a:solidFill>
-              </a:rPr>
-              <a:t>ZeroAoNinja</a:t>
-            </a:r>
-            <a:endParaRPr lang="pt-BR" sz="1050" dirty="0">
-              <a:solidFill>
-                <a:schemeClr val="bg1"/>
-              </a:solidFill>
-            </a:endParaRPr>
-          </a:p>
-          <a:p>
-            <a:pPr marL="0" lvl="0" indent="0" algn="l" rtl="0">
-              <a:spcBef>
-                <a:spcPts val="600"/>
-              </a:spcBef>
-              <a:spcAft>
-                <a:spcPts val="0"/>
-              </a:spcAft>
-              <a:buNone/>
-            </a:pPr>
-            <a:r>
-              <a:rPr lang="pt-BR" sz="1100" dirty="0">
-                <a:solidFill>
-                  <a:schemeClr val="bg1"/>
-                </a:solidFill>
-              </a:rPr>
-              <a:t>---------------------------------------</a:t>
+              <a:t>SQL Server (with Code First Approach);</a:t>
             </a:r>
           </a:p>
         </p:txBody>
       </p:sp>
+      <p:cxnSp>
+        <p:nvCxnSpPr>
+          <p:cNvPr id="16" name="Conector reto 15">
+            <a:extLst>
+              <a:ext uri="{FF2B5EF4-FFF2-40B4-BE49-F238E27FC236}">
+                <a16:creationId xmlns:a16="http://schemas.microsoft.com/office/drawing/2014/main" id="{7061C3C7-1268-1AA5-9B77-B2037E4EC1CF}"/>
+              </a:ext>
+            </a:extLst>
+          </p:cNvPr>
+          <p:cNvCxnSpPr/>
+          <p:nvPr/>
+        </p:nvCxnSpPr>
+        <p:spPr>
+          <a:xfrm>
+            <a:off x="4983060" y="2776756"/>
+            <a:ext cx="3783435" cy="0"/>
+          </a:xfrm>
+          <a:prstGeom prst="line">
+            <a:avLst/>
+          </a:prstGeom>
+        </p:spPr>
+        <p:style>
+          <a:lnRef idx="2">
+            <a:schemeClr val="accent3"/>
+          </a:lnRef>
+          <a:fillRef idx="0">
+            <a:schemeClr val="accent3"/>
+          </a:fillRef>
+          <a:effectRef idx="1">
+            <a:schemeClr val="accent3"/>
+          </a:effectRef>
+          <a:fontRef idx="minor">
+            <a:schemeClr val="tx1"/>
+          </a:fontRef>
+        </p:style>
+      </p:cxnSp>
     </p:spTree>
     <p:extLst>
       <p:ext uri="{BB962C8B-B14F-4D97-AF65-F5344CB8AC3E}">
@@ -10372,8 +10453,8 @@
   </p:clrMapOvr>
   <mc:AlternateContent xmlns:mc="http://schemas.openxmlformats.org/markup-compatibility/2006">
     <mc:Choice xmlns:p14="http://schemas.microsoft.com/office/powerpoint/2010/main" Requires="p14">
-      <p:transition spd="slow" p14:dur="1400">
-        <p14:doors dir="vert"/>
+      <p:transition spd="slow" p14:dur="1200">
+        <p14:prism/>
       </p:transition>
     </mc:Choice>
     <mc:Fallback>

</xml_diff>